<commit_message>
Updated 16S_ASV_Analysis with new code to add line at l2fc=0 for dotplots. Updated associated figure ASV l2fc dotplot v2.jpeg. Updated ASV l2fc dotplot v3.pptx to add astrices over signifcantly DA ASVs in each treatment. Updated PNG version ASV l2fc dotplot v3.png as well. Updated DOC_Analysis.R to double check stats on DOC drawdown, new figure with new y axis units for DOC_flux Surface area normalized_control corrected_per treatment.jpeg. Updated metabolite_ordination.R with new code for NMDS and associated figure NMDS_ABCDom_T0.jpg. Re ran permanovas with new mb data. Updated procrustes.R with new mb data, new pro.tests and mantel tests and new figure 16S_metabolome_nmds_procrustes.jpeg. Saved .RData.
Cleaned up .RData so it can be pushed.

Removed .RData so I could push everything else.

Moved .RData back
</commit_message>
<xml_diff>
--- a/figures/ASV l2fc dotplot v3.pptx
+++ b/figures/ASV l2fc dotplot v3.pptx
@@ -243,7 +243,7 @@
           <a:p>
             <a:fld id="{750D5A9B-82AA-4FDF-AC7B-1E80C2F8E892}" type="datetimeFigureOut">
               <a:rPr lang="en-US" smtClean="0"/>
-              <a:t>6/29/2022</a:t>
+              <a:t>11/6/2022</a:t>
             </a:fld>
             <a:endParaRPr lang="en-US"/>
           </a:p>
@@ -413,7 +413,7 @@
           <a:p>
             <a:fld id="{750D5A9B-82AA-4FDF-AC7B-1E80C2F8E892}" type="datetimeFigureOut">
               <a:rPr lang="en-US" smtClean="0"/>
-              <a:t>6/29/2022</a:t>
+              <a:t>11/6/2022</a:t>
             </a:fld>
             <a:endParaRPr lang="en-US"/>
           </a:p>
@@ -593,7 +593,7 @@
           <a:p>
             <a:fld id="{750D5A9B-82AA-4FDF-AC7B-1E80C2F8E892}" type="datetimeFigureOut">
               <a:rPr lang="en-US" smtClean="0"/>
-              <a:t>6/29/2022</a:t>
+              <a:t>11/6/2022</a:t>
             </a:fld>
             <a:endParaRPr lang="en-US"/>
           </a:p>
@@ -763,7 +763,7 @@
           <a:p>
             <a:fld id="{750D5A9B-82AA-4FDF-AC7B-1E80C2F8E892}" type="datetimeFigureOut">
               <a:rPr lang="en-US" smtClean="0"/>
-              <a:t>6/29/2022</a:t>
+              <a:t>11/6/2022</a:t>
             </a:fld>
             <a:endParaRPr lang="en-US"/>
           </a:p>
@@ -1007,7 +1007,7 @@
           <a:p>
             <a:fld id="{750D5A9B-82AA-4FDF-AC7B-1E80C2F8E892}" type="datetimeFigureOut">
               <a:rPr lang="en-US" smtClean="0"/>
-              <a:t>6/29/2022</a:t>
+              <a:t>11/6/2022</a:t>
             </a:fld>
             <a:endParaRPr lang="en-US"/>
           </a:p>
@@ -1239,7 +1239,7 @@
           <a:p>
             <a:fld id="{750D5A9B-82AA-4FDF-AC7B-1E80C2F8E892}" type="datetimeFigureOut">
               <a:rPr lang="en-US" smtClean="0"/>
-              <a:t>6/29/2022</a:t>
+              <a:t>11/6/2022</a:t>
             </a:fld>
             <a:endParaRPr lang="en-US"/>
           </a:p>
@@ -1606,7 +1606,7 @@
           <a:p>
             <a:fld id="{750D5A9B-82AA-4FDF-AC7B-1E80C2F8E892}" type="datetimeFigureOut">
               <a:rPr lang="en-US" smtClean="0"/>
-              <a:t>6/29/2022</a:t>
+              <a:t>11/6/2022</a:t>
             </a:fld>
             <a:endParaRPr lang="en-US"/>
           </a:p>
@@ -1724,7 +1724,7 @@
           <a:p>
             <a:fld id="{750D5A9B-82AA-4FDF-AC7B-1E80C2F8E892}" type="datetimeFigureOut">
               <a:rPr lang="en-US" smtClean="0"/>
-              <a:t>6/29/2022</a:t>
+              <a:t>11/6/2022</a:t>
             </a:fld>
             <a:endParaRPr lang="en-US"/>
           </a:p>
@@ -1819,7 +1819,7 @@
           <a:p>
             <a:fld id="{750D5A9B-82AA-4FDF-AC7B-1E80C2F8E892}" type="datetimeFigureOut">
               <a:rPr lang="en-US" smtClean="0"/>
-              <a:t>6/29/2022</a:t>
+              <a:t>11/6/2022</a:t>
             </a:fld>
             <a:endParaRPr lang="en-US"/>
           </a:p>
@@ -2096,7 +2096,7 @@
           <a:p>
             <a:fld id="{750D5A9B-82AA-4FDF-AC7B-1E80C2F8E892}" type="datetimeFigureOut">
               <a:rPr lang="en-US" smtClean="0"/>
-              <a:t>6/29/2022</a:t>
+              <a:t>11/6/2022</a:t>
             </a:fld>
             <a:endParaRPr lang="en-US"/>
           </a:p>
@@ -2353,7 +2353,7 @@
           <a:p>
             <a:fld id="{750D5A9B-82AA-4FDF-AC7B-1E80C2F8E892}" type="datetimeFigureOut">
               <a:rPr lang="en-US" smtClean="0"/>
-              <a:t>6/29/2022</a:t>
+              <a:t>11/6/2022</a:t>
             </a:fld>
             <a:endParaRPr lang="en-US"/>
           </a:p>
@@ -2566,7 +2566,7 @@
           <a:p>
             <a:fld id="{750D5A9B-82AA-4FDF-AC7B-1E80C2F8E892}" type="datetimeFigureOut">
               <a:rPr lang="en-US" smtClean="0"/>
-              <a:t>6/29/2022</a:t>
+              <a:t>11/6/2022</a:t>
             </a:fld>
             <a:endParaRPr lang="en-US"/>
           </a:p>
@@ -2973,10 +2973,10 @@
       </p:grpSpPr>
       <p:pic>
         <p:nvPicPr>
-          <p:cNvPr id="5" name="Picture 4" descr="Chart&#10;&#10;Description automatically generated">
-            <a:extLst>
-              <a:ext uri="{FF2B5EF4-FFF2-40B4-BE49-F238E27FC236}">
-                <a16:creationId xmlns:a16="http://schemas.microsoft.com/office/drawing/2014/main" id="{006F15BE-592E-6EB8-092E-E5AB586F7E34}"/>
+          <p:cNvPr id="4" name="Picture 3" descr="Chart&#10;&#10;Description automatically generated">
+            <a:extLst>
+              <a:ext uri="{FF2B5EF4-FFF2-40B4-BE49-F238E27FC236}">
+                <a16:creationId xmlns:a16="http://schemas.microsoft.com/office/drawing/2014/main" id="{C4A00DD3-CA81-FD7F-5569-A5807B016880}"/>
               </a:ext>
             </a:extLst>
           </p:cNvPr>
@@ -2999,7 +2999,7 @@
         </p:blipFill>
         <p:spPr>
           <a:xfrm>
-            <a:off x="0" y="0"/>
+            <a:off x="0" y="3833"/>
             <a:ext cx="18288000" cy="13716000"/>
           </a:xfrm>
           <a:prstGeom prst="rect">
@@ -3150,20 +3150,14 @@
             <a:r>
               <a:rPr lang="en-US" sz="1200" b="1" dirty="0" err="1">
                 <a:solidFill>
-                  <a:schemeClr val="tx1">
-                    <a:lumMod val="65000"/>
-                    <a:lumOff val="35000"/>
-                  </a:schemeClr>
+                  <a:srgbClr val="494949"/>
                 </a:solidFill>
               </a:rPr>
               <a:t>Cryomorphaceae</a:t>
             </a:r>
             <a:endParaRPr lang="en-US" sz="1200" b="1" dirty="0">
               <a:solidFill>
-                <a:schemeClr val="tx1">
-                  <a:lumMod val="65000"/>
-                  <a:lumOff val="35000"/>
-                </a:schemeClr>
+                <a:srgbClr val="494949"/>
               </a:solidFill>
             </a:endParaRPr>
           </a:p>
@@ -4349,7 +4343,26 @@
                   </a:schemeClr>
                 </a:solidFill>
               </a:rPr>
-              <a:t>Marine Group II</a:t>
+              <a:t>Marine </a:t>
+            </a:r>
+            <a:r>
+              <a:rPr lang="en-US" sz="1200" b="1" dirty="0">
+                <a:solidFill>
+                  <a:srgbClr val="494949"/>
+                </a:solidFill>
+              </a:rPr>
+              <a:t>Group</a:t>
+            </a:r>
+            <a:r>
+              <a:rPr lang="en-US" sz="1200" b="1" dirty="0">
+                <a:solidFill>
+                  <a:schemeClr val="tx1">
+                    <a:lumMod val="65000"/>
+                    <a:lumOff val="35000"/>
+                  </a:schemeClr>
+                </a:solidFill>
+              </a:rPr>
+              <a:t> II</a:t>
             </a:r>
           </a:p>
         </p:txBody>
@@ -5145,6 +5158,1662 @@
           </a:fontRef>
         </p:style>
       </p:cxnSp>
+      <p:sp>
+        <p:nvSpPr>
+          <p:cNvPr id="18" name="TextBox 17">
+            <a:extLst>
+              <a:ext uri="{FF2B5EF4-FFF2-40B4-BE49-F238E27FC236}">
+                <a16:creationId xmlns:a16="http://schemas.microsoft.com/office/drawing/2014/main" id="{CD0BD52E-D429-0FFA-EB8A-FD1233D5BC36}"/>
+              </a:ext>
+            </a:extLst>
+          </p:cNvPr>
+          <p:cNvSpPr txBox="1"/>
+          <p:nvPr/>
+        </p:nvSpPr>
+        <p:spPr>
+          <a:xfrm>
+            <a:off x="8257872" y="984441"/>
+            <a:ext cx="343948" cy="369332"/>
+          </a:xfrm>
+          <a:prstGeom prst="rect">
+            <a:avLst/>
+          </a:prstGeom>
+          <a:noFill/>
+        </p:spPr>
+        <p:txBody>
+          <a:bodyPr wrap="square" rtlCol="0">
+            <a:spAutoFit/>
+          </a:bodyPr>
+          <a:lstStyle/>
+          <a:p>
+            <a:pPr algn="ctr"/>
+            <a:r>
+              <a:rPr lang="en-US" dirty="0"/>
+              <a:t>*</a:t>
+            </a:r>
+          </a:p>
+        </p:txBody>
+      </p:sp>
+      <p:sp>
+        <p:nvSpPr>
+          <p:cNvPr id="19" name="TextBox 18">
+            <a:extLst>
+              <a:ext uri="{FF2B5EF4-FFF2-40B4-BE49-F238E27FC236}">
+                <a16:creationId xmlns:a16="http://schemas.microsoft.com/office/drawing/2014/main" id="{BEAAF8A9-981F-5DC0-003A-F9E038DC9515}"/>
+              </a:ext>
+            </a:extLst>
+          </p:cNvPr>
+          <p:cNvSpPr txBox="1"/>
+          <p:nvPr/>
+        </p:nvSpPr>
+        <p:spPr>
+          <a:xfrm>
+            <a:off x="8257872" y="6740802"/>
+            <a:ext cx="343948" cy="369332"/>
+          </a:xfrm>
+          <a:prstGeom prst="rect">
+            <a:avLst/>
+          </a:prstGeom>
+          <a:noFill/>
+        </p:spPr>
+        <p:txBody>
+          <a:bodyPr wrap="square" rtlCol="0">
+            <a:spAutoFit/>
+          </a:bodyPr>
+          <a:lstStyle/>
+          <a:p>
+            <a:pPr algn="ctr"/>
+            <a:r>
+              <a:rPr lang="en-US" dirty="0"/>
+              <a:t>*</a:t>
+            </a:r>
+          </a:p>
+        </p:txBody>
+      </p:sp>
+      <p:sp>
+        <p:nvSpPr>
+          <p:cNvPr id="21" name="TextBox 20">
+            <a:extLst>
+              <a:ext uri="{FF2B5EF4-FFF2-40B4-BE49-F238E27FC236}">
+                <a16:creationId xmlns:a16="http://schemas.microsoft.com/office/drawing/2014/main" id="{48629EA7-3CF4-3C94-912B-32F7CA66B1AF}"/>
+              </a:ext>
+            </a:extLst>
+          </p:cNvPr>
+          <p:cNvSpPr txBox="1"/>
+          <p:nvPr/>
+        </p:nvSpPr>
+        <p:spPr>
+          <a:xfrm>
+            <a:off x="11005933" y="1569939"/>
+            <a:ext cx="343948" cy="369332"/>
+          </a:xfrm>
+          <a:prstGeom prst="rect">
+            <a:avLst/>
+          </a:prstGeom>
+          <a:noFill/>
+        </p:spPr>
+        <p:txBody>
+          <a:bodyPr wrap="square" rtlCol="0">
+            <a:spAutoFit/>
+          </a:bodyPr>
+          <a:lstStyle/>
+          <a:p>
+            <a:pPr algn="ctr"/>
+            <a:r>
+              <a:rPr lang="en-US" dirty="0"/>
+              <a:t>*</a:t>
+            </a:r>
+          </a:p>
+        </p:txBody>
+      </p:sp>
+      <p:sp>
+        <p:nvSpPr>
+          <p:cNvPr id="23" name="TextBox 22">
+            <a:extLst>
+              <a:ext uri="{FF2B5EF4-FFF2-40B4-BE49-F238E27FC236}">
+                <a16:creationId xmlns:a16="http://schemas.microsoft.com/office/drawing/2014/main" id="{D2AB06A2-F111-92E7-7314-B7C3C5EC840F}"/>
+              </a:ext>
+            </a:extLst>
+          </p:cNvPr>
+          <p:cNvSpPr txBox="1"/>
+          <p:nvPr/>
+        </p:nvSpPr>
+        <p:spPr>
+          <a:xfrm>
+            <a:off x="5497285" y="6849307"/>
+            <a:ext cx="343948" cy="369332"/>
+          </a:xfrm>
+          <a:prstGeom prst="rect">
+            <a:avLst/>
+          </a:prstGeom>
+          <a:noFill/>
+        </p:spPr>
+        <p:txBody>
+          <a:bodyPr wrap="square" rtlCol="0">
+            <a:spAutoFit/>
+          </a:bodyPr>
+          <a:lstStyle/>
+          <a:p>
+            <a:pPr algn="ctr"/>
+            <a:r>
+              <a:rPr lang="en-US" dirty="0"/>
+              <a:t>*</a:t>
+            </a:r>
+          </a:p>
+        </p:txBody>
+      </p:sp>
+      <p:sp>
+        <p:nvSpPr>
+          <p:cNvPr id="24" name="TextBox 23">
+            <a:extLst>
+              <a:ext uri="{FF2B5EF4-FFF2-40B4-BE49-F238E27FC236}">
+                <a16:creationId xmlns:a16="http://schemas.microsoft.com/office/drawing/2014/main" id="{750176FD-BF1A-72BD-1BB4-AFB5EBD828E7}"/>
+              </a:ext>
+            </a:extLst>
+          </p:cNvPr>
+          <p:cNvSpPr txBox="1"/>
+          <p:nvPr/>
+        </p:nvSpPr>
+        <p:spPr>
+          <a:xfrm>
+            <a:off x="5507283" y="3956654"/>
+            <a:ext cx="343948" cy="369332"/>
+          </a:xfrm>
+          <a:prstGeom prst="rect">
+            <a:avLst/>
+          </a:prstGeom>
+          <a:noFill/>
+        </p:spPr>
+        <p:txBody>
+          <a:bodyPr wrap="square" rtlCol="0">
+            <a:spAutoFit/>
+          </a:bodyPr>
+          <a:lstStyle/>
+          <a:p>
+            <a:pPr algn="ctr"/>
+            <a:r>
+              <a:rPr lang="en-US" dirty="0"/>
+              <a:t>*</a:t>
+            </a:r>
+          </a:p>
+        </p:txBody>
+      </p:sp>
+      <p:sp>
+        <p:nvSpPr>
+          <p:cNvPr id="25" name="TextBox 24">
+            <a:extLst>
+              <a:ext uri="{FF2B5EF4-FFF2-40B4-BE49-F238E27FC236}">
+                <a16:creationId xmlns:a16="http://schemas.microsoft.com/office/drawing/2014/main" id="{E153DE69-24D2-7F67-8802-A12FCB256055}"/>
+              </a:ext>
+            </a:extLst>
+          </p:cNvPr>
+          <p:cNvSpPr txBox="1"/>
+          <p:nvPr/>
+        </p:nvSpPr>
+        <p:spPr>
+          <a:xfrm>
+            <a:off x="3203537" y="7059025"/>
+            <a:ext cx="343948" cy="369332"/>
+          </a:xfrm>
+          <a:prstGeom prst="rect">
+            <a:avLst/>
+          </a:prstGeom>
+          <a:noFill/>
+        </p:spPr>
+        <p:txBody>
+          <a:bodyPr wrap="square" rtlCol="0">
+            <a:spAutoFit/>
+          </a:bodyPr>
+          <a:lstStyle/>
+          <a:p>
+            <a:pPr algn="ctr"/>
+            <a:r>
+              <a:rPr lang="en-US" dirty="0"/>
+              <a:t>*</a:t>
+            </a:r>
+          </a:p>
+        </p:txBody>
+      </p:sp>
+      <p:sp>
+        <p:nvSpPr>
+          <p:cNvPr id="29" name="TextBox 28">
+            <a:extLst>
+              <a:ext uri="{FF2B5EF4-FFF2-40B4-BE49-F238E27FC236}">
+                <a16:creationId xmlns:a16="http://schemas.microsoft.com/office/drawing/2014/main" id="{E679F721-E799-4F0E-331B-F795F676B1A8}"/>
+              </a:ext>
+            </a:extLst>
+          </p:cNvPr>
+          <p:cNvSpPr txBox="1"/>
+          <p:nvPr/>
+        </p:nvSpPr>
+        <p:spPr>
+          <a:xfrm>
+            <a:off x="5952862" y="7428357"/>
+            <a:ext cx="343948" cy="369332"/>
+          </a:xfrm>
+          <a:prstGeom prst="rect">
+            <a:avLst/>
+          </a:prstGeom>
+          <a:noFill/>
+        </p:spPr>
+        <p:txBody>
+          <a:bodyPr wrap="square" rtlCol="0">
+            <a:spAutoFit/>
+          </a:bodyPr>
+          <a:lstStyle/>
+          <a:p>
+            <a:pPr algn="ctr"/>
+            <a:r>
+              <a:rPr lang="en-US" dirty="0"/>
+              <a:t>*</a:t>
+            </a:r>
+          </a:p>
+        </p:txBody>
+      </p:sp>
+      <p:sp>
+        <p:nvSpPr>
+          <p:cNvPr id="30" name="TextBox 29">
+            <a:extLst>
+              <a:ext uri="{FF2B5EF4-FFF2-40B4-BE49-F238E27FC236}">
+                <a16:creationId xmlns:a16="http://schemas.microsoft.com/office/drawing/2014/main" id="{23A45F11-0D56-787F-B79F-3A4B97CFD361}"/>
+              </a:ext>
+            </a:extLst>
+          </p:cNvPr>
+          <p:cNvSpPr txBox="1"/>
+          <p:nvPr/>
+        </p:nvSpPr>
+        <p:spPr>
+          <a:xfrm>
+            <a:off x="5962860" y="4623386"/>
+            <a:ext cx="343948" cy="369332"/>
+          </a:xfrm>
+          <a:prstGeom prst="rect">
+            <a:avLst/>
+          </a:prstGeom>
+          <a:noFill/>
+        </p:spPr>
+        <p:txBody>
+          <a:bodyPr wrap="square" rtlCol="0">
+            <a:spAutoFit/>
+          </a:bodyPr>
+          <a:lstStyle/>
+          <a:p>
+            <a:pPr algn="ctr"/>
+            <a:r>
+              <a:rPr lang="en-US" dirty="0"/>
+              <a:t>*</a:t>
+            </a:r>
+          </a:p>
+        </p:txBody>
+      </p:sp>
+      <p:sp>
+        <p:nvSpPr>
+          <p:cNvPr id="32" name="TextBox 31">
+            <a:extLst>
+              <a:ext uri="{FF2B5EF4-FFF2-40B4-BE49-F238E27FC236}">
+                <a16:creationId xmlns:a16="http://schemas.microsoft.com/office/drawing/2014/main" id="{FF26C6C5-284D-36C5-53BC-6E650F4F612F}"/>
+              </a:ext>
+            </a:extLst>
+          </p:cNvPr>
+          <p:cNvSpPr txBox="1"/>
+          <p:nvPr/>
+        </p:nvSpPr>
+        <p:spPr>
+          <a:xfrm>
+            <a:off x="6877235" y="5705512"/>
+            <a:ext cx="343948" cy="369332"/>
+          </a:xfrm>
+          <a:prstGeom prst="rect">
+            <a:avLst/>
+          </a:prstGeom>
+          <a:noFill/>
+        </p:spPr>
+        <p:txBody>
+          <a:bodyPr wrap="square" rtlCol="0">
+            <a:spAutoFit/>
+          </a:bodyPr>
+          <a:lstStyle/>
+          <a:p>
+            <a:pPr algn="ctr"/>
+            <a:r>
+              <a:rPr lang="en-US" dirty="0"/>
+              <a:t>*</a:t>
+            </a:r>
+          </a:p>
+        </p:txBody>
+      </p:sp>
+      <p:sp>
+        <p:nvSpPr>
+          <p:cNvPr id="38" name="TextBox 37">
+            <a:extLst>
+              <a:ext uri="{FF2B5EF4-FFF2-40B4-BE49-F238E27FC236}">
+                <a16:creationId xmlns:a16="http://schemas.microsoft.com/office/drawing/2014/main" id="{125A1DFB-CBCE-C9F5-5901-5F45F4396D0F}"/>
+              </a:ext>
+            </a:extLst>
+          </p:cNvPr>
+          <p:cNvSpPr txBox="1"/>
+          <p:nvPr/>
+        </p:nvSpPr>
+        <p:spPr>
+          <a:xfrm>
+            <a:off x="6874707" y="2950645"/>
+            <a:ext cx="343948" cy="369332"/>
+          </a:xfrm>
+          <a:prstGeom prst="rect">
+            <a:avLst/>
+          </a:prstGeom>
+          <a:noFill/>
+        </p:spPr>
+        <p:txBody>
+          <a:bodyPr wrap="square" rtlCol="0">
+            <a:spAutoFit/>
+          </a:bodyPr>
+          <a:lstStyle/>
+          <a:p>
+            <a:pPr algn="ctr"/>
+            <a:r>
+              <a:rPr lang="en-US" dirty="0"/>
+              <a:t>*</a:t>
+            </a:r>
+          </a:p>
+        </p:txBody>
+      </p:sp>
+      <p:sp>
+        <p:nvSpPr>
+          <p:cNvPr id="43" name="TextBox 42">
+            <a:extLst>
+              <a:ext uri="{FF2B5EF4-FFF2-40B4-BE49-F238E27FC236}">
+                <a16:creationId xmlns:a16="http://schemas.microsoft.com/office/drawing/2014/main" id="{580BE152-3D4E-84ED-83B4-42DA95AB28E2}"/>
+              </a:ext>
+            </a:extLst>
+          </p:cNvPr>
+          <p:cNvSpPr txBox="1"/>
+          <p:nvPr/>
+        </p:nvSpPr>
+        <p:spPr>
+          <a:xfrm>
+            <a:off x="6874707" y="-31555"/>
+            <a:ext cx="343948" cy="369332"/>
+          </a:xfrm>
+          <a:prstGeom prst="rect">
+            <a:avLst/>
+          </a:prstGeom>
+          <a:noFill/>
+        </p:spPr>
+        <p:txBody>
+          <a:bodyPr wrap="square" rtlCol="0">
+            <a:spAutoFit/>
+          </a:bodyPr>
+          <a:lstStyle/>
+          <a:p>
+            <a:pPr algn="ctr"/>
+            <a:r>
+              <a:rPr lang="en-US" dirty="0"/>
+              <a:t>*</a:t>
+            </a:r>
+          </a:p>
+        </p:txBody>
+      </p:sp>
+      <p:sp>
+        <p:nvSpPr>
+          <p:cNvPr id="45" name="TextBox 44">
+            <a:extLst>
+              <a:ext uri="{FF2B5EF4-FFF2-40B4-BE49-F238E27FC236}">
+                <a16:creationId xmlns:a16="http://schemas.microsoft.com/office/drawing/2014/main" id="{1CB4C713-53F5-B0A6-21F5-D96F98A0CDA3}"/>
+              </a:ext>
+            </a:extLst>
+          </p:cNvPr>
+          <p:cNvSpPr txBox="1"/>
+          <p:nvPr/>
+        </p:nvSpPr>
+        <p:spPr>
+          <a:xfrm>
+            <a:off x="6418412" y="3986129"/>
+            <a:ext cx="343948" cy="369332"/>
+          </a:xfrm>
+          <a:prstGeom prst="rect">
+            <a:avLst/>
+          </a:prstGeom>
+          <a:noFill/>
+        </p:spPr>
+        <p:txBody>
+          <a:bodyPr wrap="square" rtlCol="0">
+            <a:spAutoFit/>
+          </a:bodyPr>
+          <a:lstStyle/>
+          <a:p>
+            <a:pPr algn="ctr"/>
+            <a:r>
+              <a:rPr lang="en-US" dirty="0"/>
+              <a:t>*</a:t>
+            </a:r>
+          </a:p>
+        </p:txBody>
+      </p:sp>
+      <p:sp>
+        <p:nvSpPr>
+          <p:cNvPr id="52" name="TextBox 51">
+            <a:extLst>
+              <a:ext uri="{FF2B5EF4-FFF2-40B4-BE49-F238E27FC236}">
+                <a16:creationId xmlns:a16="http://schemas.microsoft.com/office/drawing/2014/main" id="{DC3EFD2B-8035-3181-4995-E82EF334B9B5}"/>
+              </a:ext>
+            </a:extLst>
+          </p:cNvPr>
+          <p:cNvSpPr txBox="1"/>
+          <p:nvPr/>
+        </p:nvSpPr>
+        <p:spPr>
+          <a:xfrm>
+            <a:off x="7327719" y="1582465"/>
+            <a:ext cx="343948" cy="369332"/>
+          </a:xfrm>
+          <a:prstGeom prst="rect">
+            <a:avLst/>
+          </a:prstGeom>
+          <a:noFill/>
+        </p:spPr>
+        <p:txBody>
+          <a:bodyPr wrap="square" rtlCol="0">
+            <a:spAutoFit/>
+          </a:bodyPr>
+          <a:lstStyle/>
+          <a:p>
+            <a:pPr algn="ctr"/>
+            <a:r>
+              <a:rPr lang="en-US" dirty="0"/>
+              <a:t>*</a:t>
+            </a:r>
+          </a:p>
+        </p:txBody>
+      </p:sp>
+      <p:sp>
+        <p:nvSpPr>
+          <p:cNvPr id="53" name="TextBox 52">
+            <a:extLst>
+              <a:ext uri="{FF2B5EF4-FFF2-40B4-BE49-F238E27FC236}">
+                <a16:creationId xmlns:a16="http://schemas.microsoft.com/office/drawing/2014/main" id="{379197BA-9EE6-4AAC-7E37-E062D6694065}"/>
+              </a:ext>
+            </a:extLst>
+          </p:cNvPr>
+          <p:cNvSpPr txBox="1"/>
+          <p:nvPr/>
+        </p:nvSpPr>
+        <p:spPr>
+          <a:xfrm>
+            <a:off x="7789218" y="1575878"/>
+            <a:ext cx="343948" cy="369332"/>
+          </a:xfrm>
+          <a:prstGeom prst="rect">
+            <a:avLst/>
+          </a:prstGeom>
+          <a:noFill/>
+        </p:spPr>
+        <p:txBody>
+          <a:bodyPr wrap="square" rtlCol="0">
+            <a:spAutoFit/>
+          </a:bodyPr>
+          <a:lstStyle/>
+          <a:p>
+            <a:pPr algn="ctr"/>
+            <a:r>
+              <a:rPr lang="en-US" dirty="0"/>
+              <a:t>*</a:t>
+            </a:r>
+          </a:p>
+        </p:txBody>
+      </p:sp>
+      <p:sp>
+        <p:nvSpPr>
+          <p:cNvPr id="54" name="TextBox 53">
+            <a:extLst>
+              <a:ext uri="{FF2B5EF4-FFF2-40B4-BE49-F238E27FC236}">
+                <a16:creationId xmlns:a16="http://schemas.microsoft.com/office/drawing/2014/main" id="{8174DD12-C5F7-1EF7-B755-4936D5495F4A}"/>
+              </a:ext>
+            </a:extLst>
+          </p:cNvPr>
+          <p:cNvSpPr txBox="1"/>
+          <p:nvPr/>
+        </p:nvSpPr>
+        <p:spPr>
+          <a:xfrm>
+            <a:off x="9169052" y="6874650"/>
+            <a:ext cx="343948" cy="369332"/>
+          </a:xfrm>
+          <a:prstGeom prst="rect">
+            <a:avLst/>
+          </a:prstGeom>
+          <a:noFill/>
+        </p:spPr>
+        <p:txBody>
+          <a:bodyPr wrap="square" rtlCol="0">
+            <a:spAutoFit/>
+          </a:bodyPr>
+          <a:lstStyle/>
+          <a:p>
+            <a:pPr algn="ctr"/>
+            <a:r>
+              <a:rPr lang="en-US" dirty="0"/>
+              <a:t>*</a:t>
+            </a:r>
+          </a:p>
+        </p:txBody>
+      </p:sp>
+      <p:sp>
+        <p:nvSpPr>
+          <p:cNvPr id="55" name="TextBox 54">
+            <a:extLst>
+              <a:ext uri="{FF2B5EF4-FFF2-40B4-BE49-F238E27FC236}">
+                <a16:creationId xmlns:a16="http://schemas.microsoft.com/office/drawing/2014/main" id="{02A8FA78-9563-1D03-7CA1-387959F492CD}"/>
+              </a:ext>
+            </a:extLst>
+          </p:cNvPr>
+          <p:cNvSpPr txBox="1"/>
+          <p:nvPr/>
+        </p:nvSpPr>
+        <p:spPr>
+          <a:xfrm>
+            <a:off x="9169052" y="1140444"/>
+            <a:ext cx="343948" cy="369332"/>
+          </a:xfrm>
+          <a:prstGeom prst="rect">
+            <a:avLst/>
+          </a:prstGeom>
+          <a:noFill/>
+        </p:spPr>
+        <p:txBody>
+          <a:bodyPr wrap="square" rtlCol="0">
+            <a:spAutoFit/>
+          </a:bodyPr>
+          <a:lstStyle/>
+          <a:p>
+            <a:pPr algn="ctr"/>
+            <a:r>
+              <a:rPr lang="en-US" dirty="0"/>
+              <a:t>*</a:t>
+            </a:r>
+          </a:p>
+        </p:txBody>
+      </p:sp>
+      <p:sp>
+        <p:nvSpPr>
+          <p:cNvPr id="56" name="TextBox 55">
+            <a:extLst>
+              <a:ext uri="{FF2B5EF4-FFF2-40B4-BE49-F238E27FC236}">
+                <a16:creationId xmlns:a16="http://schemas.microsoft.com/office/drawing/2014/main" id="{CA07AC6D-DB09-9876-91E6-23879765B518}"/>
+              </a:ext>
+            </a:extLst>
+          </p:cNvPr>
+          <p:cNvSpPr txBox="1"/>
+          <p:nvPr/>
+        </p:nvSpPr>
+        <p:spPr>
+          <a:xfrm>
+            <a:off x="8718115" y="4388616"/>
+            <a:ext cx="343948" cy="369332"/>
+          </a:xfrm>
+          <a:prstGeom prst="rect">
+            <a:avLst/>
+          </a:prstGeom>
+          <a:noFill/>
+        </p:spPr>
+        <p:txBody>
+          <a:bodyPr wrap="square" rtlCol="0">
+            <a:spAutoFit/>
+          </a:bodyPr>
+          <a:lstStyle/>
+          <a:p>
+            <a:pPr algn="ctr"/>
+            <a:r>
+              <a:rPr lang="en-US" dirty="0"/>
+              <a:t>*</a:t>
+            </a:r>
+          </a:p>
+        </p:txBody>
+      </p:sp>
+      <p:sp>
+        <p:nvSpPr>
+          <p:cNvPr id="57" name="TextBox 56">
+            <a:extLst>
+              <a:ext uri="{FF2B5EF4-FFF2-40B4-BE49-F238E27FC236}">
+                <a16:creationId xmlns:a16="http://schemas.microsoft.com/office/drawing/2014/main" id="{21D59846-6069-46ED-DFEE-F2E092B7CB96}"/>
+              </a:ext>
+            </a:extLst>
+          </p:cNvPr>
+          <p:cNvSpPr txBox="1"/>
+          <p:nvPr/>
+        </p:nvSpPr>
+        <p:spPr>
+          <a:xfrm>
+            <a:off x="2748880" y="1655329"/>
+            <a:ext cx="343948" cy="369332"/>
+          </a:xfrm>
+          <a:prstGeom prst="rect">
+            <a:avLst/>
+          </a:prstGeom>
+          <a:noFill/>
+        </p:spPr>
+        <p:txBody>
+          <a:bodyPr wrap="square" rtlCol="0">
+            <a:spAutoFit/>
+          </a:bodyPr>
+          <a:lstStyle/>
+          <a:p>
+            <a:pPr algn="ctr"/>
+            <a:r>
+              <a:rPr lang="en-US" dirty="0"/>
+              <a:t>*</a:t>
+            </a:r>
+          </a:p>
+        </p:txBody>
+      </p:sp>
+      <p:sp>
+        <p:nvSpPr>
+          <p:cNvPr id="58" name="TextBox 57">
+            <a:extLst>
+              <a:ext uri="{FF2B5EF4-FFF2-40B4-BE49-F238E27FC236}">
+                <a16:creationId xmlns:a16="http://schemas.microsoft.com/office/drawing/2014/main" id="{A32EE113-A45E-E171-C5A1-F5333B40355C}"/>
+              </a:ext>
+            </a:extLst>
+          </p:cNvPr>
+          <p:cNvSpPr txBox="1"/>
+          <p:nvPr/>
+        </p:nvSpPr>
+        <p:spPr>
+          <a:xfrm>
+            <a:off x="10557211" y="1315298"/>
+            <a:ext cx="343948" cy="369332"/>
+          </a:xfrm>
+          <a:prstGeom prst="rect">
+            <a:avLst/>
+          </a:prstGeom>
+          <a:noFill/>
+        </p:spPr>
+        <p:txBody>
+          <a:bodyPr wrap="square" rtlCol="0">
+            <a:spAutoFit/>
+          </a:bodyPr>
+          <a:lstStyle/>
+          <a:p>
+            <a:pPr algn="ctr"/>
+            <a:r>
+              <a:rPr lang="en-US" dirty="0"/>
+              <a:t>*</a:t>
+            </a:r>
+          </a:p>
+        </p:txBody>
+      </p:sp>
+      <p:sp>
+        <p:nvSpPr>
+          <p:cNvPr id="59" name="TextBox 58">
+            <a:extLst>
+              <a:ext uri="{FF2B5EF4-FFF2-40B4-BE49-F238E27FC236}">
+                <a16:creationId xmlns:a16="http://schemas.microsoft.com/office/drawing/2014/main" id="{F6A2273C-79BE-1273-263D-E47EF005770D}"/>
+              </a:ext>
+            </a:extLst>
+          </p:cNvPr>
+          <p:cNvSpPr txBox="1"/>
+          <p:nvPr/>
+        </p:nvSpPr>
+        <p:spPr>
+          <a:xfrm>
+            <a:off x="14686924" y="6530370"/>
+            <a:ext cx="343948" cy="369332"/>
+          </a:xfrm>
+          <a:prstGeom prst="rect">
+            <a:avLst/>
+          </a:prstGeom>
+          <a:noFill/>
+        </p:spPr>
+        <p:txBody>
+          <a:bodyPr wrap="square" rtlCol="0">
+            <a:spAutoFit/>
+          </a:bodyPr>
+          <a:lstStyle/>
+          <a:p>
+            <a:pPr algn="ctr"/>
+            <a:r>
+              <a:rPr lang="en-US" dirty="0"/>
+              <a:t>*</a:t>
+            </a:r>
+          </a:p>
+        </p:txBody>
+      </p:sp>
+      <p:sp>
+        <p:nvSpPr>
+          <p:cNvPr id="60" name="TextBox 59">
+            <a:extLst>
+              <a:ext uri="{FF2B5EF4-FFF2-40B4-BE49-F238E27FC236}">
+                <a16:creationId xmlns:a16="http://schemas.microsoft.com/office/drawing/2014/main" id="{43661339-6A83-522D-E4CF-BB33C1EF1C46}"/>
+              </a:ext>
+            </a:extLst>
+          </p:cNvPr>
+          <p:cNvSpPr txBox="1"/>
+          <p:nvPr/>
+        </p:nvSpPr>
+        <p:spPr>
+          <a:xfrm>
+            <a:off x="5039943" y="2160131"/>
+            <a:ext cx="343948" cy="369332"/>
+          </a:xfrm>
+          <a:prstGeom prst="rect">
+            <a:avLst/>
+          </a:prstGeom>
+          <a:noFill/>
+        </p:spPr>
+        <p:txBody>
+          <a:bodyPr wrap="square" rtlCol="0">
+            <a:spAutoFit/>
+          </a:bodyPr>
+          <a:lstStyle/>
+          <a:p>
+            <a:pPr algn="ctr"/>
+            <a:r>
+              <a:rPr lang="en-US" dirty="0"/>
+              <a:t>*</a:t>
+            </a:r>
+          </a:p>
+        </p:txBody>
+      </p:sp>
+      <p:sp>
+        <p:nvSpPr>
+          <p:cNvPr id="61" name="TextBox 60">
+            <a:extLst>
+              <a:ext uri="{FF2B5EF4-FFF2-40B4-BE49-F238E27FC236}">
+                <a16:creationId xmlns:a16="http://schemas.microsoft.com/office/drawing/2014/main" id="{BE857902-5F41-C52C-C9E8-F36717FFAD4B}"/>
+              </a:ext>
+            </a:extLst>
+          </p:cNvPr>
+          <p:cNvSpPr txBox="1"/>
+          <p:nvPr/>
+        </p:nvSpPr>
+        <p:spPr>
+          <a:xfrm>
+            <a:off x="11462839" y="1325110"/>
+            <a:ext cx="343948" cy="369332"/>
+          </a:xfrm>
+          <a:prstGeom prst="rect">
+            <a:avLst/>
+          </a:prstGeom>
+          <a:noFill/>
+        </p:spPr>
+        <p:txBody>
+          <a:bodyPr wrap="square" rtlCol="0">
+            <a:spAutoFit/>
+          </a:bodyPr>
+          <a:lstStyle/>
+          <a:p>
+            <a:pPr algn="ctr"/>
+            <a:r>
+              <a:rPr lang="en-US" dirty="0"/>
+              <a:t>*</a:t>
+            </a:r>
+          </a:p>
+        </p:txBody>
+      </p:sp>
+      <p:sp>
+        <p:nvSpPr>
+          <p:cNvPr id="62" name="TextBox 61">
+            <a:extLst>
+              <a:ext uri="{FF2B5EF4-FFF2-40B4-BE49-F238E27FC236}">
+                <a16:creationId xmlns:a16="http://schemas.microsoft.com/office/drawing/2014/main" id="{73529BE2-AA66-F96F-A5AE-37AF2ACA0FB4}"/>
+              </a:ext>
+            </a:extLst>
+          </p:cNvPr>
+          <p:cNvSpPr txBox="1"/>
+          <p:nvPr/>
+        </p:nvSpPr>
+        <p:spPr>
+          <a:xfrm>
+            <a:off x="10080232" y="7014943"/>
+            <a:ext cx="343948" cy="369332"/>
+          </a:xfrm>
+          <a:prstGeom prst="rect">
+            <a:avLst/>
+          </a:prstGeom>
+          <a:noFill/>
+        </p:spPr>
+        <p:txBody>
+          <a:bodyPr wrap="square" rtlCol="0">
+            <a:spAutoFit/>
+          </a:bodyPr>
+          <a:lstStyle/>
+          <a:p>
+            <a:pPr algn="ctr"/>
+            <a:r>
+              <a:rPr lang="en-US" dirty="0"/>
+              <a:t>*</a:t>
+            </a:r>
+          </a:p>
+        </p:txBody>
+      </p:sp>
+      <p:sp>
+        <p:nvSpPr>
+          <p:cNvPr id="65" name="TextBox 64">
+            <a:extLst>
+              <a:ext uri="{FF2B5EF4-FFF2-40B4-BE49-F238E27FC236}">
+                <a16:creationId xmlns:a16="http://schemas.microsoft.com/office/drawing/2014/main" id="{16B6A868-C00E-500B-5ECA-C867F80CAFF1}"/>
+              </a:ext>
+            </a:extLst>
+          </p:cNvPr>
+          <p:cNvSpPr txBox="1"/>
+          <p:nvPr/>
+        </p:nvSpPr>
+        <p:spPr>
+          <a:xfrm>
+            <a:off x="10092758" y="1244743"/>
+            <a:ext cx="343948" cy="369332"/>
+          </a:xfrm>
+          <a:prstGeom prst="rect">
+            <a:avLst/>
+          </a:prstGeom>
+          <a:noFill/>
+        </p:spPr>
+        <p:txBody>
+          <a:bodyPr wrap="square" rtlCol="0">
+            <a:spAutoFit/>
+          </a:bodyPr>
+          <a:lstStyle/>
+          <a:p>
+            <a:pPr algn="ctr"/>
+            <a:r>
+              <a:rPr lang="en-US" dirty="0"/>
+              <a:t>*</a:t>
+            </a:r>
+          </a:p>
+        </p:txBody>
+      </p:sp>
+      <p:sp>
+        <p:nvSpPr>
+          <p:cNvPr id="66" name="TextBox 65">
+            <a:extLst>
+              <a:ext uri="{FF2B5EF4-FFF2-40B4-BE49-F238E27FC236}">
+                <a16:creationId xmlns:a16="http://schemas.microsoft.com/office/drawing/2014/main" id="{296432AB-19D2-4378-0396-4EEB4E18CA68}"/>
+              </a:ext>
+            </a:extLst>
+          </p:cNvPr>
+          <p:cNvSpPr txBox="1"/>
+          <p:nvPr/>
+        </p:nvSpPr>
+        <p:spPr>
+          <a:xfrm>
+            <a:off x="2287338" y="925228"/>
+            <a:ext cx="343948" cy="369332"/>
+          </a:xfrm>
+          <a:prstGeom prst="rect">
+            <a:avLst/>
+          </a:prstGeom>
+          <a:noFill/>
+        </p:spPr>
+        <p:txBody>
+          <a:bodyPr wrap="square" rtlCol="0">
+            <a:spAutoFit/>
+          </a:bodyPr>
+          <a:lstStyle/>
+          <a:p>
+            <a:pPr algn="ctr"/>
+            <a:r>
+              <a:rPr lang="en-US" dirty="0"/>
+              <a:t>*</a:t>
+            </a:r>
+          </a:p>
+        </p:txBody>
+      </p:sp>
+      <p:sp>
+        <p:nvSpPr>
+          <p:cNvPr id="68" name="TextBox 67">
+            <a:extLst>
+              <a:ext uri="{FF2B5EF4-FFF2-40B4-BE49-F238E27FC236}">
+                <a16:creationId xmlns:a16="http://schemas.microsoft.com/office/drawing/2014/main" id="{C6DC9D54-714B-DEB7-D7CF-744448C67EF9}"/>
+              </a:ext>
+            </a:extLst>
+          </p:cNvPr>
+          <p:cNvSpPr txBox="1"/>
+          <p:nvPr/>
+        </p:nvSpPr>
+        <p:spPr>
+          <a:xfrm>
+            <a:off x="13304396" y="6454923"/>
+            <a:ext cx="343948" cy="369332"/>
+          </a:xfrm>
+          <a:prstGeom prst="rect">
+            <a:avLst/>
+          </a:prstGeom>
+          <a:noFill/>
+        </p:spPr>
+        <p:txBody>
+          <a:bodyPr wrap="square" rtlCol="0">
+            <a:spAutoFit/>
+          </a:bodyPr>
+          <a:lstStyle/>
+          <a:p>
+            <a:pPr algn="ctr"/>
+            <a:r>
+              <a:rPr lang="en-US" dirty="0"/>
+              <a:t>*</a:t>
+            </a:r>
+          </a:p>
+        </p:txBody>
+      </p:sp>
+      <p:sp>
+        <p:nvSpPr>
+          <p:cNvPr id="69" name="TextBox 68">
+            <a:extLst>
+              <a:ext uri="{FF2B5EF4-FFF2-40B4-BE49-F238E27FC236}">
+                <a16:creationId xmlns:a16="http://schemas.microsoft.com/office/drawing/2014/main" id="{64A8A7C6-6F62-937C-C336-EB3F6270FDD6}"/>
+              </a:ext>
+            </a:extLst>
+          </p:cNvPr>
+          <p:cNvSpPr txBox="1"/>
+          <p:nvPr/>
+        </p:nvSpPr>
+        <p:spPr>
+          <a:xfrm>
+            <a:off x="13304396" y="3561593"/>
+            <a:ext cx="343948" cy="369332"/>
+          </a:xfrm>
+          <a:prstGeom prst="rect">
+            <a:avLst/>
+          </a:prstGeom>
+          <a:noFill/>
+        </p:spPr>
+        <p:txBody>
+          <a:bodyPr wrap="square" rtlCol="0">
+            <a:spAutoFit/>
+          </a:bodyPr>
+          <a:lstStyle/>
+          <a:p>
+            <a:pPr algn="ctr"/>
+            <a:r>
+              <a:rPr lang="en-US" dirty="0"/>
+              <a:t>*</a:t>
+            </a:r>
+          </a:p>
+        </p:txBody>
+      </p:sp>
+      <p:sp>
+        <p:nvSpPr>
+          <p:cNvPr id="70" name="TextBox 69">
+            <a:extLst>
+              <a:ext uri="{FF2B5EF4-FFF2-40B4-BE49-F238E27FC236}">
+                <a16:creationId xmlns:a16="http://schemas.microsoft.com/office/drawing/2014/main" id="{1DFEE04F-34D3-E8ED-1510-98354D1DC89D}"/>
+              </a:ext>
+            </a:extLst>
+          </p:cNvPr>
+          <p:cNvSpPr txBox="1"/>
+          <p:nvPr/>
+        </p:nvSpPr>
+        <p:spPr>
+          <a:xfrm>
+            <a:off x="13767683" y="6467449"/>
+            <a:ext cx="343948" cy="369332"/>
+          </a:xfrm>
+          <a:prstGeom prst="rect">
+            <a:avLst/>
+          </a:prstGeom>
+          <a:noFill/>
+        </p:spPr>
+        <p:txBody>
+          <a:bodyPr wrap="square" rtlCol="0">
+            <a:spAutoFit/>
+          </a:bodyPr>
+          <a:lstStyle/>
+          <a:p>
+            <a:pPr algn="ctr"/>
+            <a:r>
+              <a:rPr lang="en-US" dirty="0"/>
+              <a:t>*</a:t>
+            </a:r>
+          </a:p>
+        </p:txBody>
+      </p:sp>
+      <p:sp>
+        <p:nvSpPr>
+          <p:cNvPr id="71" name="TextBox 70">
+            <a:extLst>
+              <a:ext uri="{FF2B5EF4-FFF2-40B4-BE49-F238E27FC236}">
+                <a16:creationId xmlns:a16="http://schemas.microsoft.com/office/drawing/2014/main" id="{8D018DA1-218B-A638-D470-73D5216178F6}"/>
+              </a:ext>
+            </a:extLst>
+          </p:cNvPr>
+          <p:cNvSpPr txBox="1"/>
+          <p:nvPr/>
+        </p:nvSpPr>
+        <p:spPr>
+          <a:xfrm>
+            <a:off x="13767683" y="3686176"/>
+            <a:ext cx="343948" cy="369332"/>
+          </a:xfrm>
+          <a:prstGeom prst="rect">
+            <a:avLst/>
+          </a:prstGeom>
+          <a:noFill/>
+        </p:spPr>
+        <p:txBody>
+          <a:bodyPr wrap="square" rtlCol="0">
+            <a:spAutoFit/>
+          </a:bodyPr>
+          <a:lstStyle/>
+          <a:p>
+            <a:pPr algn="ctr"/>
+            <a:r>
+              <a:rPr lang="en-US" dirty="0"/>
+              <a:t>*</a:t>
+            </a:r>
+          </a:p>
+        </p:txBody>
+      </p:sp>
+      <p:sp>
+        <p:nvSpPr>
+          <p:cNvPr id="72" name="TextBox 71">
+            <a:extLst>
+              <a:ext uri="{FF2B5EF4-FFF2-40B4-BE49-F238E27FC236}">
+                <a16:creationId xmlns:a16="http://schemas.microsoft.com/office/drawing/2014/main" id="{76234A03-9E8E-BC2A-B778-6B454CFD4527}"/>
+              </a:ext>
+            </a:extLst>
+          </p:cNvPr>
+          <p:cNvSpPr txBox="1"/>
+          <p:nvPr/>
+        </p:nvSpPr>
+        <p:spPr>
+          <a:xfrm>
+            <a:off x="13767683" y="652687"/>
+            <a:ext cx="343948" cy="369332"/>
+          </a:xfrm>
+          <a:prstGeom prst="rect">
+            <a:avLst/>
+          </a:prstGeom>
+          <a:noFill/>
+        </p:spPr>
+        <p:txBody>
+          <a:bodyPr wrap="square" rtlCol="0">
+            <a:spAutoFit/>
+          </a:bodyPr>
+          <a:lstStyle/>
+          <a:p>
+            <a:pPr algn="ctr"/>
+            <a:r>
+              <a:rPr lang="en-US" dirty="0"/>
+              <a:t>*</a:t>
+            </a:r>
+          </a:p>
+        </p:txBody>
+      </p:sp>
+      <p:sp>
+        <p:nvSpPr>
+          <p:cNvPr id="73" name="TextBox 72">
+            <a:extLst>
+              <a:ext uri="{FF2B5EF4-FFF2-40B4-BE49-F238E27FC236}">
+                <a16:creationId xmlns:a16="http://schemas.microsoft.com/office/drawing/2014/main" id="{463EF4C9-E232-1B2B-70B6-DDDA27C1A734}"/>
+              </a:ext>
+            </a:extLst>
+          </p:cNvPr>
+          <p:cNvSpPr txBox="1"/>
+          <p:nvPr/>
+        </p:nvSpPr>
+        <p:spPr>
+          <a:xfrm>
+            <a:off x="14220372" y="6436371"/>
+            <a:ext cx="343948" cy="369332"/>
+          </a:xfrm>
+          <a:prstGeom prst="rect">
+            <a:avLst/>
+          </a:prstGeom>
+          <a:noFill/>
+        </p:spPr>
+        <p:txBody>
+          <a:bodyPr wrap="square" rtlCol="0">
+            <a:spAutoFit/>
+          </a:bodyPr>
+          <a:lstStyle/>
+          <a:p>
+            <a:pPr algn="ctr"/>
+            <a:r>
+              <a:rPr lang="en-US" dirty="0"/>
+              <a:t>*</a:t>
+            </a:r>
+          </a:p>
+        </p:txBody>
+      </p:sp>
+      <p:sp>
+        <p:nvSpPr>
+          <p:cNvPr id="80" name="TextBox 79">
+            <a:extLst>
+              <a:ext uri="{FF2B5EF4-FFF2-40B4-BE49-F238E27FC236}">
+                <a16:creationId xmlns:a16="http://schemas.microsoft.com/office/drawing/2014/main" id="{171CB467-AE04-66D3-03F2-9D3162457D0F}"/>
+              </a:ext>
+            </a:extLst>
+          </p:cNvPr>
+          <p:cNvSpPr txBox="1"/>
+          <p:nvPr/>
+        </p:nvSpPr>
+        <p:spPr>
+          <a:xfrm>
+            <a:off x="14220372" y="3642572"/>
+            <a:ext cx="343948" cy="369332"/>
+          </a:xfrm>
+          <a:prstGeom prst="rect">
+            <a:avLst/>
+          </a:prstGeom>
+          <a:noFill/>
+        </p:spPr>
+        <p:txBody>
+          <a:bodyPr wrap="square" rtlCol="0">
+            <a:spAutoFit/>
+          </a:bodyPr>
+          <a:lstStyle/>
+          <a:p>
+            <a:pPr algn="ctr"/>
+            <a:r>
+              <a:rPr lang="en-US" dirty="0"/>
+              <a:t>*</a:t>
+            </a:r>
+          </a:p>
+        </p:txBody>
+      </p:sp>
+      <p:sp>
+        <p:nvSpPr>
+          <p:cNvPr id="84" name="TextBox 83">
+            <a:extLst>
+              <a:ext uri="{FF2B5EF4-FFF2-40B4-BE49-F238E27FC236}">
+                <a16:creationId xmlns:a16="http://schemas.microsoft.com/office/drawing/2014/main" id="{88727E94-07CD-E215-8D41-20F0193AE7C2}"/>
+              </a:ext>
+            </a:extLst>
+          </p:cNvPr>
+          <p:cNvSpPr txBox="1"/>
+          <p:nvPr/>
+        </p:nvSpPr>
+        <p:spPr>
+          <a:xfrm>
+            <a:off x="14220372" y="684239"/>
+            <a:ext cx="343948" cy="369332"/>
+          </a:xfrm>
+          <a:prstGeom prst="rect">
+            <a:avLst/>
+          </a:prstGeom>
+          <a:noFill/>
+        </p:spPr>
+        <p:txBody>
+          <a:bodyPr wrap="square" rtlCol="0">
+            <a:spAutoFit/>
+          </a:bodyPr>
+          <a:lstStyle/>
+          <a:p>
+            <a:pPr algn="ctr"/>
+            <a:r>
+              <a:rPr lang="en-US" dirty="0"/>
+              <a:t>*</a:t>
+            </a:r>
+          </a:p>
+        </p:txBody>
+      </p:sp>
+      <p:sp>
+        <p:nvSpPr>
+          <p:cNvPr id="85" name="TextBox 84">
+            <a:extLst>
+              <a:ext uri="{FF2B5EF4-FFF2-40B4-BE49-F238E27FC236}">
+                <a16:creationId xmlns:a16="http://schemas.microsoft.com/office/drawing/2014/main" id="{D41058BF-8EAB-9875-ACF8-D05E820926AD}"/>
+              </a:ext>
+            </a:extLst>
+          </p:cNvPr>
+          <p:cNvSpPr txBox="1"/>
+          <p:nvPr/>
+        </p:nvSpPr>
+        <p:spPr>
+          <a:xfrm>
+            <a:off x="11933011" y="984441"/>
+            <a:ext cx="343948" cy="369332"/>
+          </a:xfrm>
+          <a:prstGeom prst="rect">
+            <a:avLst/>
+          </a:prstGeom>
+          <a:noFill/>
+        </p:spPr>
+        <p:txBody>
+          <a:bodyPr wrap="square" rtlCol="0">
+            <a:spAutoFit/>
+          </a:bodyPr>
+          <a:lstStyle/>
+          <a:p>
+            <a:pPr algn="ctr"/>
+            <a:r>
+              <a:rPr lang="en-US" dirty="0"/>
+              <a:t>*</a:t>
+            </a:r>
+          </a:p>
+        </p:txBody>
+      </p:sp>
+      <p:sp>
+        <p:nvSpPr>
+          <p:cNvPr id="86" name="TextBox 85">
+            <a:extLst>
+              <a:ext uri="{FF2B5EF4-FFF2-40B4-BE49-F238E27FC236}">
+                <a16:creationId xmlns:a16="http://schemas.microsoft.com/office/drawing/2014/main" id="{97D1C319-F289-E3DF-6058-5D367DD03AA8}"/>
+              </a:ext>
+            </a:extLst>
+          </p:cNvPr>
+          <p:cNvSpPr txBox="1"/>
+          <p:nvPr/>
+        </p:nvSpPr>
+        <p:spPr>
+          <a:xfrm>
+            <a:off x="12396298" y="996967"/>
+            <a:ext cx="343948" cy="369332"/>
+          </a:xfrm>
+          <a:prstGeom prst="rect">
+            <a:avLst/>
+          </a:prstGeom>
+          <a:noFill/>
+        </p:spPr>
+        <p:txBody>
+          <a:bodyPr wrap="square" rtlCol="0">
+            <a:spAutoFit/>
+          </a:bodyPr>
+          <a:lstStyle/>
+          <a:p>
+            <a:pPr algn="ctr"/>
+            <a:r>
+              <a:rPr lang="en-US" dirty="0"/>
+              <a:t>*</a:t>
+            </a:r>
+          </a:p>
+        </p:txBody>
+      </p:sp>
+      <p:sp>
+        <p:nvSpPr>
+          <p:cNvPr id="87" name="TextBox 86">
+            <a:extLst>
+              <a:ext uri="{FF2B5EF4-FFF2-40B4-BE49-F238E27FC236}">
+                <a16:creationId xmlns:a16="http://schemas.microsoft.com/office/drawing/2014/main" id="{6714549F-D95E-86F7-67DD-3F1391AE0EEB}"/>
+              </a:ext>
+            </a:extLst>
+          </p:cNvPr>
+          <p:cNvSpPr txBox="1"/>
+          <p:nvPr/>
+        </p:nvSpPr>
+        <p:spPr>
+          <a:xfrm>
+            <a:off x="9630413" y="1106242"/>
+            <a:ext cx="343948" cy="369332"/>
+          </a:xfrm>
+          <a:prstGeom prst="rect">
+            <a:avLst/>
+          </a:prstGeom>
+          <a:noFill/>
+        </p:spPr>
+        <p:txBody>
+          <a:bodyPr wrap="square" rtlCol="0">
+            <a:spAutoFit/>
+          </a:bodyPr>
+          <a:lstStyle/>
+          <a:p>
+            <a:pPr algn="ctr"/>
+            <a:r>
+              <a:rPr lang="en-US" dirty="0"/>
+              <a:t>*</a:t>
+            </a:r>
+          </a:p>
+        </p:txBody>
+      </p:sp>
+      <p:sp>
+        <p:nvSpPr>
+          <p:cNvPr id="88" name="TextBox 87">
+            <a:extLst>
+              <a:ext uri="{FF2B5EF4-FFF2-40B4-BE49-F238E27FC236}">
+                <a16:creationId xmlns:a16="http://schemas.microsoft.com/office/drawing/2014/main" id="{1F414A24-2ABE-09E7-8C18-7315D28C6D4E}"/>
+              </a:ext>
+            </a:extLst>
+          </p:cNvPr>
+          <p:cNvSpPr txBox="1"/>
+          <p:nvPr/>
+        </p:nvSpPr>
+        <p:spPr>
+          <a:xfrm>
+            <a:off x="12844191" y="725099"/>
+            <a:ext cx="343948" cy="369332"/>
+          </a:xfrm>
+          <a:prstGeom prst="rect">
+            <a:avLst/>
+          </a:prstGeom>
+          <a:noFill/>
+        </p:spPr>
+        <p:txBody>
+          <a:bodyPr wrap="square" rtlCol="0">
+            <a:spAutoFit/>
+          </a:bodyPr>
+          <a:lstStyle/>
+          <a:p>
+            <a:pPr algn="ctr"/>
+            <a:r>
+              <a:rPr lang="en-US" dirty="0"/>
+              <a:t>*</a:t>
+            </a:r>
+          </a:p>
+        </p:txBody>
+      </p:sp>
+      <p:sp>
+        <p:nvSpPr>
+          <p:cNvPr id="89" name="TextBox 88">
+            <a:extLst>
+              <a:ext uri="{FF2B5EF4-FFF2-40B4-BE49-F238E27FC236}">
+                <a16:creationId xmlns:a16="http://schemas.microsoft.com/office/drawing/2014/main" id="{CDDEA4DD-EEBB-9C2D-3F95-BE839C7A2134}"/>
+              </a:ext>
+            </a:extLst>
+          </p:cNvPr>
+          <p:cNvSpPr txBox="1"/>
+          <p:nvPr/>
+        </p:nvSpPr>
+        <p:spPr>
+          <a:xfrm>
+            <a:off x="1825784" y="1106242"/>
+            <a:ext cx="343948" cy="369332"/>
+          </a:xfrm>
+          <a:prstGeom prst="rect">
+            <a:avLst/>
+          </a:prstGeom>
+          <a:noFill/>
+        </p:spPr>
+        <p:txBody>
+          <a:bodyPr wrap="square" rtlCol="0">
+            <a:spAutoFit/>
+          </a:bodyPr>
+          <a:lstStyle/>
+          <a:p>
+            <a:pPr algn="ctr"/>
+            <a:r>
+              <a:rPr lang="en-US" dirty="0"/>
+              <a:t>*</a:t>
+            </a:r>
+          </a:p>
+        </p:txBody>
+      </p:sp>
+      <p:sp>
+        <p:nvSpPr>
+          <p:cNvPr id="90" name="TextBox 89">
+            <a:extLst>
+              <a:ext uri="{FF2B5EF4-FFF2-40B4-BE49-F238E27FC236}">
+                <a16:creationId xmlns:a16="http://schemas.microsoft.com/office/drawing/2014/main" id="{C3990259-521B-667C-5982-8D70869954EB}"/>
+              </a:ext>
+            </a:extLst>
+          </p:cNvPr>
+          <p:cNvSpPr txBox="1"/>
+          <p:nvPr/>
+        </p:nvSpPr>
+        <p:spPr>
+          <a:xfrm>
+            <a:off x="1370059" y="4509858"/>
+            <a:ext cx="343948" cy="369332"/>
+          </a:xfrm>
+          <a:prstGeom prst="rect">
+            <a:avLst/>
+          </a:prstGeom>
+          <a:noFill/>
+        </p:spPr>
+        <p:txBody>
+          <a:bodyPr wrap="square" rtlCol="0">
+            <a:spAutoFit/>
+          </a:bodyPr>
+          <a:lstStyle/>
+          <a:p>
+            <a:pPr algn="ctr"/>
+            <a:r>
+              <a:rPr lang="en-US" dirty="0"/>
+              <a:t>*</a:t>
+            </a:r>
+          </a:p>
+        </p:txBody>
+      </p:sp>
+      <p:sp>
+        <p:nvSpPr>
+          <p:cNvPr id="91" name="TextBox 90">
+            <a:extLst>
+              <a:ext uri="{FF2B5EF4-FFF2-40B4-BE49-F238E27FC236}">
+                <a16:creationId xmlns:a16="http://schemas.microsoft.com/office/drawing/2014/main" id="{5306B939-D8F2-BB57-9F4E-7FC591FBCD9A}"/>
+              </a:ext>
+            </a:extLst>
+          </p:cNvPr>
+          <p:cNvSpPr txBox="1"/>
+          <p:nvPr/>
+        </p:nvSpPr>
+        <p:spPr>
+          <a:xfrm>
+            <a:off x="9634738" y="3969595"/>
+            <a:ext cx="343948" cy="369332"/>
+          </a:xfrm>
+          <a:prstGeom prst="rect">
+            <a:avLst/>
+          </a:prstGeom>
+          <a:noFill/>
+        </p:spPr>
+        <p:txBody>
+          <a:bodyPr wrap="square" rtlCol="0">
+            <a:spAutoFit/>
+          </a:bodyPr>
+          <a:lstStyle/>
+          <a:p>
+            <a:pPr algn="ctr"/>
+            <a:r>
+              <a:rPr lang="en-US" dirty="0"/>
+              <a:t>*</a:t>
+            </a:r>
+          </a:p>
+        </p:txBody>
+      </p:sp>
+      <p:sp>
+        <p:nvSpPr>
+          <p:cNvPr id="92" name="TextBox 91">
+            <a:extLst>
+              <a:ext uri="{FF2B5EF4-FFF2-40B4-BE49-F238E27FC236}">
+                <a16:creationId xmlns:a16="http://schemas.microsoft.com/office/drawing/2014/main" id="{AC90A056-F5B9-ACCF-25F2-865E4E8DF399}"/>
+              </a:ext>
+            </a:extLst>
+          </p:cNvPr>
+          <p:cNvSpPr txBox="1"/>
+          <p:nvPr/>
+        </p:nvSpPr>
+        <p:spPr>
+          <a:xfrm>
+            <a:off x="3658396" y="6824255"/>
+            <a:ext cx="343948" cy="369332"/>
+          </a:xfrm>
+          <a:prstGeom prst="rect">
+            <a:avLst/>
+          </a:prstGeom>
+          <a:noFill/>
+        </p:spPr>
+        <p:txBody>
+          <a:bodyPr wrap="square" rtlCol="0">
+            <a:spAutoFit/>
+          </a:bodyPr>
+          <a:lstStyle/>
+          <a:p>
+            <a:pPr algn="ctr"/>
+            <a:r>
+              <a:rPr lang="en-US" dirty="0"/>
+              <a:t>*</a:t>
+            </a:r>
+          </a:p>
+        </p:txBody>
+      </p:sp>
+      <p:sp>
+        <p:nvSpPr>
+          <p:cNvPr id="93" name="TextBox 92">
+            <a:extLst>
+              <a:ext uri="{FF2B5EF4-FFF2-40B4-BE49-F238E27FC236}">
+                <a16:creationId xmlns:a16="http://schemas.microsoft.com/office/drawing/2014/main" id="{20334DA9-E5D1-B9CE-57FE-9970D6B39FC8}"/>
+              </a:ext>
+            </a:extLst>
+          </p:cNvPr>
+          <p:cNvSpPr txBox="1"/>
+          <p:nvPr/>
+        </p:nvSpPr>
+        <p:spPr>
+          <a:xfrm>
+            <a:off x="3670922" y="3973603"/>
+            <a:ext cx="343948" cy="369332"/>
+          </a:xfrm>
+          <a:prstGeom prst="rect">
+            <a:avLst/>
+          </a:prstGeom>
+          <a:noFill/>
+        </p:spPr>
+        <p:txBody>
+          <a:bodyPr wrap="square" rtlCol="0">
+            <a:spAutoFit/>
+          </a:bodyPr>
+          <a:lstStyle/>
+          <a:p>
+            <a:pPr algn="ctr"/>
+            <a:r>
+              <a:rPr lang="en-US" dirty="0"/>
+              <a:t>*</a:t>
+            </a:r>
+          </a:p>
+        </p:txBody>
+      </p:sp>
+      <p:sp>
+        <p:nvSpPr>
+          <p:cNvPr id="94" name="TextBox 93">
+            <a:extLst>
+              <a:ext uri="{FF2B5EF4-FFF2-40B4-BE49-F238E27FC236}">
+                <a16:creationId xmlns:a16="http://schemas.microsoft.com/office/drawing/2014/main" id="{8E9FEC08-8B5D-60D0-9A55-D4E7538A16F3}"/>
+              </a:ext>
+            </a:extLst>
+          </p:cNvPr>
+          <p:cNvSpPr txBox="1"/>
+          <p:nvPr/>
+        </p:nvSpPr>
+        <p:spPr>
+          <a:xfrm>
+            <a:off x="4583130" y="5726873"/>
+            <a:ext cx="343948" cy="369332"/>
+          </a:xfrm>
+          <a:prstGeom prst="rect">
+            <a:avLst/>
+          </a:prstGeom>
+          <a:noFill/>
+        </p:spPr>
+        <p:txBody>
+          <a:bodyPr wrap="square" rtlCol="0">
+            <a:spAutoFit/>
+          </a:bodyPr>
+          <a:lstStyle/>
+          <a:p>
+            <a:pPr algn="ctr"/>
+            <a:r>
+              <a:rPr lang="en-US" dirty="0"/>
+              <a:t>*</a:t>
+            </a:r>
+          </a:p>
+        </p:txBody>
+      </p:sp>
+      <p:sp>
+        <p:nvSpPr>
+          <p:cNvPr id="95" name="TextBox 94">
+            <a:extLst>
+              <a:ext uri="{FF2B5EF4-FFF2-40B4-BE49-F238E27FC236}">
+                <a16:creationId xmlns:a16="http://schemas.microsoft.com/office/drawing/2014/main" id="{A61D379C-AB2C-7536-745B-2AEA8DC2E1DE}"/>
+              </a:ext>
+            </a:extLst>
+          </p:cNvPr>
+          <p:cNvSpPr txBox="1"/>
+          <p:nvPr/>
+        </p:nvSpPr>
+        <p:spPr>
+          <a:xfrm>
+            <a:off x="4583130" y="2888015"/>
+            <a:ext cx="343948" cy="369332"/>
+          </a:xfrm>
+          <a:prstGeom prst="rect">
+            <a:avLst/>
+          </a:prstGeom>
+          <a:noFill/>
+        </p:spPr>
+        <p:txBody>
+          <a:bodyPr wrap="square" rtlCol="0">
+            <a:spAutoFit/>
+          </a:bodyPr>
+          <a:lstStyle/>
+          <a:p>
+            <a:pPr algn="ctr"/>
+            <a:r>
+              <a:rPr lang="en-US" dirty="0"/>
+              <a:t>*</a:t>
+            </a:r>
+          </a:p>
+        </p:txBody>
+      </p:sp>
+      <p:sp>
+        <p:nvSpPr>
+          <p:cNvPr id="98" name="TextBox 97">
+            <a:extLst>
+              <a:ext uri="{FF2B5EF4-FFF2-40B4-BE49-F238E27FC236}">
+                <a16:creationId xmlns:a16="http://schemas.microsoft.com/office/drawing/2014/main" id="{97D9BC29-393F-B2F4-6B94-605EC235FE51}"/>
+              </a:ext>
+            </a:extLst>
+          </p:cNvPr>
+          <p:cNvSpPr txBox="1"/>
+          <p:nvPr/>
+        </p:nvSpPr>
+        <p:spPr>
+          <a:xfrm>
+            <a:off x="4583123" y="-31555"/>
+            <a:ext cx="343948" cy="369332"/>
+          </a:xfrm>
+          <a:prstGeom prst="rect">
+            <a:avLst/>
+          </a:prstGeom>
+          <a:noFill/>
+        </p:spPr>
+        <p:txBody>
+          <a:bodyPr wrap="square" rtlCol="0">
+            <a:spAutoFit/>
+          </a:bodyPr>
+          <a:lstStyle/>
+          <a:p>
+            <a:pPr algn="ctr"/>
+            <a:r>
+              <a:rPr lang="en-US" dirty="0"/>
+              <a:t>*</a:t>
+            </a:r>
+          </a:p>
+        </p:txBody>
+      </p:sp>
+      <p:sp>
+        <p:nvSpPr>
+          <p:cNvPr id="99" name="TextBox 98">
+            <a:extLst>
+              <a:ext uri="{FF2B5EF4-FFF2-40B4-BE49-F238E27FC236}">
+                <a16:creationId xmlns:a16="http://schemas.microsoft.com/office/drawing/2014/main" id="{DBF7A753-8D38-A0BD-364C-6DF8199E0CA3}"/>
+              </a:ext>
+            </a:extLst>
+          </p:cNvPr>
+          <p:cNvSpPr txBox="1"/>
+          <p:nvPr/>
+        </p:nvSpPr>
+        <p:spPr>
+          <a:xfrm>
+            <a:off x="4124907" y="1044327"/>
+            <a:ext cx="343948" cy="369332"/>
+          </a:xfrm>
+          <a:prstGeom prst="rect">
+            <a:avLst/>
+          </a:prstGeom>
+          <a:noFill/>
+        </p:spPr>
+        <p:txBody>
+          <a:bodyPr wrap="square" rtlCol="0">
+            <a:spAutoFit/>
+          </a:bodyPr>
+          <a:lstStyle/>
+          <a:p>
+            <a:pPr algn="ctr"/>
+            <a:r>
+              <a:rPr lang="en-US" dirty="0"/>
+              <a:t>*</a:t>
+            </a:r>
+          </a:p>
+        </p:txBody>
+      </p:sp>
     </p:spTree>
     <p:extLst>
       <p:ext uri="{BB962C8B-B14F-4D97-AF65-F5344CB8AC3E}">

</xml_diff>